<commit_message>
Pruebas ejemplo codigo + docs
</commit_message>
<xml_diff>
--- a/example/presentation_generated.pptx
+++ b/example/presentation_generated.pptx
@@ -2917,8 +2917,8 @@
         </p:blipFill>
         <p:spPr>
           <a:xfrm>
-            <a:off x="1383664" y="1825625"/>
-            <a:ext cx="4866642" cy="3649980"/>
+            <a:off x="2445385" y="2553335"/>
+            <a:ext cx="2743200" cy="2194560"/>
           </a:xfrm>
           <a:prstGeom prst="rect">
             <a:avLst/>
@@ -3093,7 +3093,7 @@
           <a:p>
             <a:pPr/>
             <a:r>
-              <a:t>step 1: {{ step[3].name }}</a:t>
+              <a:t>step 1: production2</a:t>
             </a:r>
           </a:p>
         </p:txBody>

</xml_diff>